<commit_message>
Update Projet Ballon MétéoV2.pptx
</commit_message>
<xml_diff>
--- a/présentation/Projet Ballon MétéoV2.pptx
+++ b/présentation/Projet Ballon MétéoV2.pptx
@@ -9,11 +9,14 @@
     <p:sldId id="257" r:id="rId3"/>
     <p:sldId id="258" r:id="rId4"/>
     <p:sldId id="264" r:id="rId5"/>
-    <p:sldId id="259" r:id="rId6"/>
-    <p:sldId id="260" r:id="rId7"/>
-    <p:sldId id="262" r:id="rId8"/>
-    <p:sldId id="263" r:id="rId9"/>
-    <p:sldId id="261" r:id="rId10"/>
+    <p:sldId id="267" r:id="rId6"/>
+    <p:sldId id="266" r:id="rId7"/>
+    <p:sldId id="259" r:id="rId8"/>
+    <p:sldId id="260" r:id="rId9"/>
+    <p:sldId id="262" r:id="rId10"/>
+    <p:sldId id="263" r:id="rId11"/>
+    <p:sldId id="261" r:id="rId12"/>
+    <p:sldId id="265" r:id="rId13"/>
   </p:sldIdLst>
   <p:sldSz cx="12192000" cy="6858000"/>
   <p:notesSz cx="6858000" cy="9144000"/>
@@ -306,7 +309,7 @@
           <a:p>
             <a:fld id="{4AAD347D-5ACD-4C99-B74B-A9C85AD731AF}" type="datetimeFigureOut">
               <a:rPr lang="en-US" dirty="0"/>
-              <a:t>4/8/19</a:t>
+              <a:t>5/3/19</a:t>
             </a:fld>
             <a:endParaRPr lang="en-US" dirty="0"/>
           </a:p>
@@ -348,7 +351,7 @@
           <a:p>
             <a:fld id="{D57F1E4F-1CFF-5643-939E-02111984F565}" type="slidenum">
               <a:rPr lang="en-US" dirty="0"/>
-              <a:t>‹#›</a:t>
+              <a:t>‹N°›</a:t>
             </a:fld>
             <a:endParaRPr lang="en-US" dirty="0"/>
           </a:p>
@@ -576,7 +579,7 @@
           <a:p>
             <a:fld id="{4509A250-FF31-4206-8172-F9D3106AACB1}" type="datetimeFigureOut">
               <a:rPr lang="en-US" dirty="0"/>
-              <a:t>4/8/19</a:t>
+              <a:t>5/3/19</a:t>
             </a:fld>
             <a:endParaRPr lang="en-US" dirty="0"/>
           </a:p>
@@ -618,7 +621,7 @@
           <a:p>
             <a:fld id="{D57F1E4F-1CFF-5643-939E-02111984F565}" type="slidenum">
               <a:rPr lang="en-US" dirty="0"/>
-              <a:t>‹#›</a:t>
+              <a:t>‹N°›</a:t>
             </a:fld>
             <a:endParaRPr lang="en-US" dirty="0"/>
           </a:p>
@@ -765,7 +768,7 @@
           <a:p>
             <a:fld id="{4509A250-FF31-4206-8172-F9D3106AACB1}" type="datetimeFigureOut">
               <a:rPr lang="en-US" dirty="0"/>
-              <a:t>4/8/19</a:t>
+              <a:t>5/3/19</a:t>
             </a:fld>
             <a:endParaRPr lang="en-US" dirty="0"/>
           </a:p>
@@ -807,7 +810,7 @@
           <a:p>
             <a:fld id="{D57F1E4F-1CFF-5643-939E-02111984F565}" type="slidenum">
               <a:rPr lang="en-US" dirty="0"/>
-              <a:t>‹#›</a:t>
+              <a:t>‹N°›</a:t>
             </a:fld>
             <a:endParaRPr lang="en-US" dirty="0"/>
           </a:p>
@@ -1033,7 +1036,7 @@
           <a:p>
             <a:fld id="{4509A250-FF31-4206-8172-F9D3106AACB1}" type="datetimeFigureOut">
               <a:rPr lang="en-US" dirty="0"/>
-              <a:t>4/8/19</a:t>
+              <a:t>5/3/19</a:t>
             </a:fld>
             <a:endParaRPr lang="en-US" dirty="0"/>
           </a:p>
@@ -1075,7 +1078,7 @@
           <a:p>
             <a:fld id="{D57F1E4F-1CFF-5643-939E-02111984F565}" type="slidenum">
               <a:rPr lang="en-US" dirty="0"/>
-              <a:t>‹#›</a:t>
+              <a:t>‹N°›</a:t>
             </a:fld>
             <a:endParaRPr lang="en-US" dirty="0"/>
           </a:p>
@@ -1369,7 +1372,7 @@
           <a:p>
             <a:fld id="{4509A250-FF31-4206-8172-F9D3106AACB1}" type="datetimeFigureOut">
               <a:rPr lang="en-US" dirty="0"/>
-              <a:t>4/8/19</a:t>
+              <a:t>5/3/19</a:t>
             </a:fld>
             <a:endParaRPr lang="en-US" dirty="0"/>
           </a:p>
@@ -1411,7 +1414,7 @@
           <a:p>
             <a:fld id="{D57F1E4F-1CFF-5643-939E-02111984F565}" type="slidenum">
               <a:rPr lang="en-US" dirty="0"/>
-              <a:t>‹#›</a:t>
+              <a:t>‹N°›</a:t>
             </a:fld>
             <a:endParaRPr lang="en-US" dirty="0"/>
           </a:p>
@@ -1987,7 +1990,7 @@
           <a:p>
             <a:fld id="{4509A250-FF31-4206-8172-F9D3106AACB1}" type="datetimeFigureOut">
               <a:rPr lang="en-US" dirty="0"/>
-              <a:t>4/8/19</a:t>
+              <a:t>5/3/19</a:t>
             </a:fld>
             <a:endParaRPr lang="en-US" dirty="0"/>
           </a:p>
@@ -2029,7 +2032,7 @@
           <a:p>
             <a:fld id="{D57F1E4F-1CFF-5643-939E-02111984F565}" type="slidenum">
               <a:rPr lang="en-US" dirty="0"/>
-              <a:t>‹#›</a:t>
+              <a:t>‹N°›</a:t>
             </a:fld>
             <a:endParaRPr lang="en-US" dirty="0"/>
           </a:p>
@@ -2842,7 +2845,7 @@
           <a:p>
             <a:fld id="{4509A250-FF31-4206-8172-F9D3106AACB1}" type="datetimeFigureOut">
               <a:rPr lang="en-US" dirty="0"/>
-              <a:t>4/8/19</a:t>
+              <a:t>5/3/19</a:t>
             </a:fld>
             <a:endParaRPr lang="en-US" dirty="0"/>
           </a:p>
@@ -2884,7 +2887,7 @@
           <a:p>
             <a:fld id="{D57F1E4F-1CFF-5643-939E-02111984F565}" type="slidenum">
               <a:rPr lang="en-US" dirty="0"/>
-              <a:t>‹#›</a:t>
+              <a:t>‹N°›</a:t>
             </a:fld>
             <a:endParaRPr lang="en-US" dirty="0"/>
           </a:p>
@@ -3007,7 +3010,7 @@
           <a:p>
             <a:fld id="{4509A250-FF31-4206-8172-F9D3106AACB1}" type="datetimeFigureOut">
               <a:rPr lang="en-US" dirty="0"/>
-              <a:t>4/8/19</a:t>
+              <a:t>5/3/19</a:t>
             </a:fld>
             <a:endParaRPr lang="en-US" dirty="0"/>
           </a:p>
@@ -3049,7 +3052,7 @@
           <a:p>
             <a:fld id="{D57F1E4F-1CFF-5643-939E-02111984F565}" type="slidenum">
               <a:rPr lang="en-US" dirty="0"/>
-              <a:t>‹#›</a:t>
+              <a:t>‹N°›</a:t>
             </a:fld>
             <a:endParaRPr lang="en-US" dirty="0"/>
           </a:p>
@@ -3182,7 +3185,7 @@
           <a:p>
             <a:fld id="{4509A250-FF31-4206-8172-F9D3106AACB1}" type="datetimeFigureOut">
               <a:rPr lang="en-US" dirty="0"/>
-              <a:t>4/8/19</a:t>
+              <a:t>5/3/19</a:t>
             </a:fld>
             <a:endParaRPr lang="en-US" dirty="0"/>
           </a:p>
@@ -3224,7 +3227,7 @@
           <a:p>
             <a:fld id="{D57F1E4F-1CFF-5643-939E-02111984F565}" type="slidenum">
               <a:rPr lang="en-US" dirty="0"/>
-              <a:t>‹#›</a:t>
+              <a:t>‹N°›</a:t>
             </a:fld>
             <a:endParaRPr lang="en-US" dirty="0"/>
           </a:p>
@@ -3347,7 +3350,7 @@
           <a:p>
             <a:fld id="{4509A250-FF31-4206-8172-F9D3106AACB1}" type="datetimeFigureOut">
               <a:rPr lang="en-US" dirty="0"/>
-              <a:t>4/8/19</a:t>
+              <a:t>5/3/19</a:t>
             </a:fld>
             <a:endParaRPr lang="en-US" dirty="0"/>
           </a:p>
@@ -3389,7 +3392,7 @@
           <a:p>
             <a:fld id="{D57F1E4F-1CFF-5643-939E-02111984F565}" type="slidenum">
               <a:rPr lang="en-US" dirty="0"/>
-              <a:t>‹#›</a:t>
+              <a:t>‹N°›</a:t>
             </a:fld>
             <a:endParaRPr lang="en-US" dirty="0"/>
           </a:p>
@@ -3589,7 +3592,7 @@
           <a:p>
             <a:fld id="{9796027F-7875-4030-9381-8BD8C4F21935}" type="datetimeFigureOut">
               <a:rPr lang="en-US" dirty="0"/>
-              <a:t>4/8/19</a:t>
+              <a:t>5/3/19</a:t>
             </a:fld>
             <a:endParaRPr lang="en-US" dirty="0"/>
           </a:p>
@@ -3631,7 +3634,7 @@
           <a:p>
             <a:fld id="{D57F1E4F-1CFF-5643-939E-02111984F565}" type="slidenum">
               <a:rPr lang="en-US" dirty="0"/>
-              <a:t>‹#›</a:t>
+              <a:t>‹N°›</a:t>
             </a:fld>
             <a:endParaRPr lang="en-US" dirty="0"/>
           </a:p>
@@ -3876,7 +3879,7 @@
           <a:p>
             <a:fld id="{9796027F-7875-4030-9381-8BD8C4F21935}" type="datetimeFigureOut">
               <a:rPr lang="en-US" dirty="0"/>
-              <a:t>4/8/19</a:t>
+              <a:t>5/3/19</a:t>
             </a:fld>
             <a:endParaRPr lang="en-US" dirty="0"/>
           </a:p>
@@ -3918,7 +3921,7 @@
           <a:p>
             <a:fld id="{D57F1E4F-1CFF-5643-939E-02111984F565}" type="slidenum">
               <a:rPr lang="en-US" dirty="0"/>
-              <a:t>‹#›</a:t>
+              <a:t>‹N°›</a:t>
             </a:fld>
             <a:endParaRPr lang="en-US" dirty="0"/>
           </a:p>
@@ -4315,7 +4318,7 @@
           <a:p>
             <a:fld id="{9796027F-7875-4030-9381-8BD8C4F21935}" type="datetimeFigureOut">
               <a:rPr lang="en-US" dirty="0"/>
-              <a:t>4/8/19</a:t>
+              <a:t>5/3/19</a:t>
             </a:fld>
             <a:endParaRPr lang="en-US" dirty="0"/>
           </a:p>
@@ -4357,7 +4360,7 @@
           <a:p>
             <a:fld id="{D57F1E4F-1CFF-5643-939E-02111984F565}" type="slidenum">
               <a:rPr lang="en-US" dirty="0"/>
-              <a:t>‹#›</a:t>
+              <a:t>‹N°›</a:t>
             </a:fld>
             <a:endParaRPr lang="en-US" dirty="0"/>
           </a:p>
@@ -4428,7 +4431,7 @@
           <a:p>
             <a:fld id="{4509A250-FF31-4206-8172-F9D3106AACB1}" type="datetimeFigureOut">
               <a:rPr lang="en-US" dirty="0"/>
-              <a:t>4/8/19</a:t>
+              <a:t>5/3/19</a:t>
             </a:fld>
             <a:endParaRPr lang="en-US" dirty="0"/>
           </a:p>
@@ -4470,7 +4473,7 @@
           <a:p>
             <a:fld id="{D57F1E4F-1CFF-5643-939E-02111984F565}" type="slidenum">
               <a:rPr lang="en-US" dirty="0"/>
-              <a:t>‹#›</a:t>
+              <a:t>‹N°›</a:t>
             </a:fld>
             <a:endParaRPr lang="en-US" dirty="0"/>
           </a:p>
@@ -4518,7 +4521,7 @@
           <a:p>
             <a:fld id="{4509A250-FF31-4206-8172-F9D3106AACB1}" type="datetimeFigureOut">
               <a:rPr lang="en-US" dirty="0"/>
-              <a:t>4/8/19</a:t>
+              <a:t>5/3/19</a:t>
             </a:fld>
             <a:endParaRPr lang="en-US" dirty="0"/>
           </a:p>
@@ -4560,7 +4563,7 @@
           <a:p>
             <a:fld id="{D57F1E4F-1CFF-5643-939E-02111984F565}" type="slidenum">
               <a:rPr lang="en-US" dirty="0"/>
-              <a:t>‹#›</a:t>
+              <a:t>‹N°›</a:t>
             </a:fld>
             <a:endParaRPr lang="en-US" dirty="0"/>
           </a:p>
@@ -4792,7 +4795,7 @@
           <a:p>
             <a:fld id="{4509A250-FF31-4206-8172-F9D3106AACB1}" type="datetimeFigureOut">
               <a:rPr lang="en-US" dirty="0"/>
-              <a:t>4/8/19</a:t>
+              <a:t>5/3/19</a:t>
             </a:fld>
             <a:endParaRPr lang="en-US" dirty="0"/>
           </a:p>
@@ -4834,7 +4837,7 @@
           <a:p>
             <a:fld id="{D57F1E4F-1CFF-5643-939E-02111984F565}" type="slidenum">
               <a:rPr lang="en-US" dirty="0"/>
-              <a:t>‹#›</a:t>
+              <a:t>‹N°›</a:t>
             </a:fld>
             <a:endParaRPr lang="en-US" dirty="0"/>
           </a:p>
@@ -5062,7 +5065,7 @@
           <a:p>
             <a:fld id="{4509A250-FF31-4206-8172-F9D3106AACB1}" type="datetimeFigureOut">
               <a:rPr lang="en-US" dirty="0"/>
-              <a:t>4/8/19</a:t>
+              <a:t>5/3/19</a:t>
             </a:fld>
             <a:endParaRPr lang="en-US" dirty="0"/>
           </a:p>
@@ -5104,7 +5107,7 @@
           <a:p>
             <a:fld id="{D57F1E4F-1CFF-5643-939E-02111984F565}" type="slidenum">
               <a:rPr lang="en-US" dirty="0"/>
-              <a:t>‹#›</a:t>
+              <a:t>‹N°›</a:t>
             </a:fld>
             <a:endParaRPr lang="en-US" dirty="0"/>
           </a:p>
@@ -5486,7 +5489,7 @@
           <a:p>
             <a:fld id="{4AAD347D-5ACD-4C99-B74B-A9C85AD731AF}" type="datetimeFigureOut">
               <a:rPr lang="en-US" dirty="0"/>
-              <a:t>4/8/19</a:t>
+              <a:t>5/3/19</a:t>
             </a:fld>
             <a:endParaRPr lang="en-US" dirty="0"/>
           </a:p>
@@ -5565,7 +5568,7 @@
           <a:p>
             <a:fld id="{D57F1E4F-1CFF-5643-939E-02111984F565}" type="slidenum">
               <a:rPr lang="en-US" dirty="0"/>
-              <a:t>‹#›</a:t>
+              <a:t>‹N°›</a:t>
             </a:fld>
             <a:endParaRPr lang="en-US" dirty="0"/>
           </a:p>
@@ -6046,7 +6049,7 @@
           <p:cNvPr id="2" name="Titre 1">
             <a:extLst>
               <a:ext uri="{FF2B5EF4-FFF2-40B4-BE49-F238E27FC236}">
-                <a16:creationId xmlns:a16="http://schemas.microsoft.com/office/drawing/2014/main" xmlns="" id="{5C272326-A48E-4182-B362-6ED93F262892}"/>
+                <a16:creationId xmlns:a16="http://schemas.microsoft.com/office/drawing/2014/main" id="{5C272326-A48E-4182-B362-6ED93F262892}"/>
               </a:ext>
             </a:extLst>
           </p:cNvPr>
@@ -6074,7 +6077,7 @@
           <p:cNvPr id="3" name="Sous-titre 2">
             <a:extLst>
               <a:ext uri="{FF2B5EF4-FFF2-40B4-BE49-F238E27FC236}">
-                <a16:creationId xmlns:a16="http://schemas.microsoft.com/office/drawing/2014/main" xmlns="" id="{200CBDE5-1F6D-4C56-89BB-B9BF5BFCAAC1}"/>
+                <a16:creationId xmlns:a16="http://schemas.microsoft.com/office/drawing/2014/main" id="{200CBDE5-1F6D-4C56-89BB-B9BF5BFCAAC1}"/>
               </a:ext>
             </a:extLst>
           </p:cNvPr>
@@ -6092,13 +6095,8 @@
           <a:p>
             <a:r>
               <a:rPr lang="fr-FR" dirty="0"/>
-              <a:t>réALISé PAR Cousson Antoine et Brault </a:t>
-            </a:r>
-            <a:r>
-              <a:rPr lang="fr-FR" dirty="0" smtClean="0"/>
-              <a:t>Yann </a:t>
-            </a:r>
-            <a:endParaRPr lang="fr-FR" dirty="0"/>
+              <a:t>réALISé PAR Cousson Antoine et Brault Yann </a:t>
+            </a:r>
           </a:p>
         </p:txBody>
       </p:sp>
@@ -6244,6 +6242,349 @@
 </p:sld>
 </file>
 
+<file path=ppt/slides/slide10.xml><?xml version="1.0" encoding="utf-8"?>
+<p:sld xmlns:a="http://schemas.openxmlformats.org/drawingml/2006/main" xmlns:r="http://schemas.openxmlformats.org/officeDocument/2006/relationships" xmlns:p="http://schemas.openxmlformats.org/presentationml/2006/main">
+  <p:cSld>
+    <p:spTree>
+      <p:nvGrpSpPr>
+        <p:cNvPr id="1" name=""/>
+        <p:cNvGrpSpPr/>
+        <p:nvPr/>
+      </p:nvGrpSpPr>
+      <p:grpSpPr>
+        <a:xfrm>
+          <a:off x="0" y="0"/>
+          <a:ext cx="0" cy="0"/>
+          <a:chOff x="0" y="0"/>
+          <a:chExt cx="0" cy="0"/>
+        </a:xfrm>
+      </p:grpSpPr>
+      <p:sp>
+        <p:nvSpPr>
+          <p:cNvPr id="2" name="Titre 1">
+            <a:extLst>
+              <a:ext uri="{FF2B5EF4-FFF2-40B4-BE49-F238E27FC236}">
+                <a16:creationId xmlns:a16="http://schemas.microsoft.com/office/drawing/2014/main" id="{5AE92176-05D7-4878-967B-433628B2F204}"/>
+              </a:ext>
+            </a:extLst>
+          </p:cNvPr>
+          <p:cNvSpPr>
+            <a:spLocks noGrp="1"/>
+          </p:cNvSpPr>
+          <p:nvPr>
+            <p:ph type="title"/>
+          </p:nvPr>
+        </p:nvSpPr>
+        <p:spPr/>
+        <p:txBody>
+          <a:bodyPr/>
+          <a:lstStyle/>
+          <a:p>
+            <a:r>
+              <a:rPr lang="fr-FR" dirty="0"/>
+              <a:t>Planning du travail</a:t>
+            </a:r>
+          </a:p>
+        </p:txBody>
+      </p:sp>
+      <p:pic>
+        <p:nvPicPr>
+          <p:cNvPr id="4" name="Espace réservé du contenu 3"/>
+          <p:cNvPicPr>
+            <a:picLocks noGrp="1" noChangeAspect="1"/>
+          </p:cNvPicPr>
+          <p:nvPr>
+            <p:ph idx="1"/>
+          </p:nvPr>
+        </p:nvPicPr>
+        <p:blipFill>
+          <a:blip r:embed="rId2">
+            <a:extLst>
+              <a:ext uri="{28A0092B-C50C-407E-A947-70E740481C1C}">
+                <a14:useLocalDpi xmlns:a14="http://schemas.microsoft.com/office/drawing/2010/main" val="0"/>
+              </a:ext>
+            </a:extLst>
+          </a:blip>
+          <a:stretch>
+            <a:fillRect/>
+          </a:stretch>
+        </p:blipFill>
+        <p:spPr>
+          <a:xfrm>
+            <a:off x="646111" y="2248525"/>
+            <a:ext cx="10428593" cy="3462081"/>
+          </a:xfrm>
+        </p:spPr>
+      </p:pic>
+    </p:spTree>
+    <p:extLst>
+      <p:ext uri="{BB962C8B-B14F-4D97-AF65-F5344CB8AC3E}">
+        <p14:creationId xmlns:p14="http://schemas.microsoft.com/office/powerpoint/2010/main" val="64445786"/>
+      </p:ext>
+    </p:extLst>
+  </p:cSld>
+  <p:clrMapOvr>
+    <a:masterClrMapping/>
+  </p:clrMapOvr>
+</p:sld>
+</file>
+
+<file path=ppt/slides/slide11.xml><?xml version="1.0" encoding="utf-8"?>
+<p:sld xmlns:a="http://schemas.openxmlformats.org/drawingml/2006/main" xmlns:r="http://schemas.openxmlformats.org/officeDocument/2006/relationships" xmlns:p="http://schemas.openxmlformats.org/presentationml/2006/main">
+  <p:cSld>
+    <p:spTree>
+      <p:nvGrpSpPr>
+        <p:cNvPr id="1" name=""/>
+        <p:cNvGrpSpPr/>
+        <p:nvPr/>
+      </p:nvGrpSpPr>
+      <p:grpSpPr>
+        <a:xfrm>
+          <a:off x="0" y="0"/>
+          <a:ext cx="0" cy="0"/>
+          <a:chOff x="0" y="0"/>
+          <a:chExt cx="0" cy="0"/>
+        </a:xfrm>
+      </p:grpSpPr>
+      <p:sp>
+        <p:nvSpPr>
+          <p:cNvPr id="2" name="Titre 1">
+            <a:extLst>
+              <a:ext uri="{FF2B5EF4-FFF2-40B4-BE49-F238E27FC236}">
+                <a16:creationId xmlns:a16="http://schemas.microsoft.com/office/drawing/2014/main" id="{ED8DFBD5-2E68-4F5F-B291-4D6060674A26}"/>
+              </a:ext>
+            </a:extLst>
+          </p:cNvPr>
+          <p:cNvSpPr>
+            <a:spLocks noGrp="1"/>
+          </p:cNvSpPr>
+          <p:nvPr>
+            <p:ph type="title"/>
+          </p:nvPr>
+        </p:nvSpPr>
+        <p:spPr/>
+        <p:txBody>
+          <a:bodyPr/>
+          <a:lstStyle/>
+          <a:p>
+            <a:r>
+              <a:rPr lang="fr-FR" dirty="0"/>
+              <a:t>Répartition du travail</a:t>
+            </a:r>
+          </a:p>
+        </p:txBody>
+      </p:sp>
+      <p:pic>
+        <p:nvPicPr>
+          <p:cNvPr id="7" name="Espace réservé du contenu 6"/>
+          <p:cNvPicPr>
+            <a:picLocks noGrp="1" noChangeAspect="1"/>
+          </p:cNvPicPr>
+          <p:nvPr>
+            <p:ph idx="1"/>
+          </p:nvPr>
+        </p:nvPicPr>
+        <p:blipFill>
+          <a:blip r:embed="rId2">
+            <a:extLst>
+              <a:ext uri="{28A0092B-C50C-407E-A947-70E740481C1C}">
+                <a14:useLocalDpi xmlns:a14="http://schemas.microsoft.com/office/drawing/2010/main" val="0"/>
+              </a:ext>
+            </a:extLst>
+          </a:blip>
+          <a:stretch>
+            <a:fillRect/>
+          </a:stretch>
+        </p:blipFill>
+        <p:spPr>
+          <a:xfrm>
+            <a:off x="2073427" y="2052638"/>
+            <a:ext cx="7006922" cy="4195762"/>
+          </a:xfrm>
+        </p:spPr>
+      </p:pic>
+    </p:spTree>
+    <p:extLst>
+      <p:ext uri="{BB962C8B-B14F-4D97-AF65-F5344CB8AC3E}">
+        <p14:creationId xmlns:p14="http://schemas.microsoft.com/office/powerpoint/2010/main" val="1088639980"/>
+      </p:ext>
+    </p:extLst>
+  </p:cSld>
+  <p:clrMapOvr>
+    <a:masterClrMapping/>
+  </p:clrMapOvr>
+  <p:timing>
+    <p:tnLst>
+      <p:par>
+        <p:cTn id="1" dur="indefinite" restart="never" nodeType="tmRoot">
+          <p:childTnLst>
+            <p:seq concurrent="1" nextAc="seek">
+              <p:cTn id="2" dur="indefinite" nodeType="mainSeq">
+                <p:childTnLst>
+                  <p:par>
+                    <p:cTn id="3" fill="hold">
+                      <p:stCondLst>
+                        <p:cond delay="indefinite"/>
+                      </p:stCondLst>
+                      <p:childTnLst>
+                        <p:par>
+                          <p:cTn id="4" fill="hold">
+                            <p:stCondLst>
+                              <p:cond delay="0"/>
+                            </p:stCondLst>
+                            <p:childTnLst>
+                              <p:par>
+                                <p:cTn id="5" presetID="10" presetClass="entr" presetSubtype="0" fill="hold" nodeType="clickEffect">
+                                  <p:stCondLst>
+                                    <p:cond delay="0"/>
+                                  </p:stCondLst>
+                                  <p:childTnLst>
+                                    <p:set>
+                                      <p:cBhvr>
+                                        <p:cTn id="6" dur="1" fill="hold">
+                                          <p:stCondLst>
+                                            <p:cond delay="0"/>
+                                          </p:stCondLst>
+                                        </p:cTn>
+                                        <p:tgtEl>
+                                          <p:spTgt spid="7"/>
+                                        </p:tgtEl>
+                                        <p:attrNameLst>
+                                          <p:attrName>style.visibility</p:attrName>
+                                        </p:attrNameLst>
+                                      </p:cBhvr>
+                                      <p:to>
+                                        <p:strVal val="visible"/>
+                                      </p:to>
+                                    </p:set>
+                                    <p:animEffect transition="in" filter="fade">
+                                      <p:cBhvr>
+                                        <p:cTn id="7" dur="500"/>
+                                        <p:tgtEl>
+                                          <p:spTgt spid="7"/>
+                                        </p:tgtEl>
+                                      </p:cBhvr>
+                                    </p:animEffect>
+                                  </p:childTnLst>
+                                </p:cTn>
+                              </p:par>
+                            </p:childTnLst>
+                          </p:cTn>
+                        </p:par>
+                      </p:childTnLst>
+                    </p:cTn>
+                  </p:par>
+                </p:childTnLst>
+              </p:cTn>
+              <p:prevCondLst>
+                <p:cond evt="onPrev" delay="0">
+                  <p:tgtEl>
+                    <p:sldTgt/>
+                  </p:tgtEl>
+                </p:cond>
+              </p:prevCondLst>
+              <p:nextCondLst>
+                <p:cond evt="onNext" delay="0">
+                  <p:tgtEl>
+                    <p:sldTgt/>
+                  </p:tgtEl>
+                </p:cond>
+              </p:nextCondLst>
+            </p:seq>
+          </p:childTnLst>
+        </p:cTn>
+      </p:par>
+    </p:tnLst>
+  </p:timing>
+</p:sld>
+</file>
+
+<file path=ppt/slides/slide12.xml><?xml version="1.0" encoding="utf-8"?>
+<p:sld xmlns:a="http://schemas.openxmlformats.org/drawingml/2006/main" xmlns:r="http://schemas.openxmlformats.org/officeDocument/2006/relationships" xmlns:p="http://schemas.openxmlformats.org/presentationml/2006/main">
+  <p:cSld>
+    <p:spTree>
+      <p:nvGrpSpPr>
+        <p:cNvPr id="1" name=""/>
+        <p:cNvGrpSpPr/>
+        <p:nvPr/>
+      </p:nvGrpSpPr>
+      <p:grpSpPr>
+        <a:xfrm>
+          <a:off x="0" y="0"/>
+          <a:ext cx="0" cy="0"/>
+          <a:chOff x="0" y="0"/>
+          <a:chExt cx="0" cy="0"/>
+        </a:xfrm>
+      </p:grpSpPr>
+      <p:sp>
+        <p:nvSpPr>
+          <p:cNvPr id="2" name="Titre 1">
+            <a:extLst>
+              <a:ext uri="{FF2B5EF4-FFF2-40B4-BE49-F238E27FC236}">
+                <a16:creationId xmlns:a16="http://schemas.microsoft.com/office/drawing/2014/main" id="{B2D6BFAD-C2E6-3D41-8F95-0931442C6B5D}"/>
+              </a:ext>
+            </a:extLst>
+          </p:cNvPr>
+          <p:cNvSpPr>
+            <a:spLocks noGrp="1"/>
+          </p:cNvSpPr>
+          <p:nvPr>
+            <p:ph type="title"/>
+          </p:nvPr>
+        </p:nvSpPr>
+        <p:spPr/>
+        <p:txBody>
+          <a:bodyPr/>
+          <a:lstStyle/>
+          <a:p>
+            <a:r>
+              <a:rPr lang="fr-FR" dirty="0"/>
+              <a:t>Mise en fonctionnement du projet</a:t>
+            </a:r>
+          </a:p>
+        </p:txBody>
+      </p:sp>
+      <p:sp>
+        <p:nvSpPr>
+          <p:cNvPr id="3" name="Espace réservé du contenu 2">
+            <a:extLst>
+              <a:ext uri="{FF2B5EF4-FFF2-40B4-BE49-F238E27FC236}">
+                <a16:creationId xmlns:a16="http://schemas.microsoft.com/office/drawing/2014/main" id="{B6692D32-D7D4-EC48-B561-31B2476F7CBE}"/>
+              </a:ext>
+            </a:extLst>
+          </p:cNvPr>
+          <p:cNvSpPr>
+            <a:spLocks noGrp="1"/>
+          </p:cNvSpPr>
+          <p:nvPr>
+            <p:ph idx="1"/>
+          </p:nvPr>
+        </p:nvSpPr>
+        <p:spPr/>
+        <p:txBody>
+          <a:bodyPr/>
+          <a:lstStyle/>
+          <a:p>
+            <a:pPr marL="0" indent="0">
+              <a:buNone/>
+            </a:pPr>
+            <a:endParaRPr lang="fr-FR" dirty="0"/>
+          </a:p>
+        </p:txBody>
+      </p:sp>
+    </p:spTree>
+    <p:extLst>
+      <p:ext uri="{BB962C8B-B14F-4D97-AF65-F5344CB8AC3E}">
+        <p14:creationId xmlns:p14="http://schemas.microsoft.com/office/powerpoint/2010/main" val="2132695445"/>
+      </p:ext>
+    </p:extLst>
+  </p:cSld>
+  <p:clrMapOvr>
+    <a:masterClrMapping/>
+  </p:clrMapOvr>
+</p:sld>
+</file>
+
 <file path=ppt/slides/slide2.xml><?xml version="1.0" encoding="utf-8"?>
 <p:sld xmlns:a="http://schemas.openxmlformats.org/drawingml/2006/main" xmlns:r="http://schemas.openxmlformats.org/officeDocument/2006/relationships" xmlns:p="http://schemas.openxmlformats.org/presentationml/2006/main">
   <p:cSld>
@@ -6266,7 +6607,7 @@
           <p:cNvPr id="2" name="Titre 1">
             <a:extLst>
               <a:ext uri="{FF2B5EF4-FFF2-40B4-BE49-F238E27FC236}">
-                <a16:creationId xmlns:a16="http://schemas.microsoft.com/office/drawing/2014/main" xmlns="" id="{86BB3AA1-35AA-4C71-8069-5FAB12703749}"/>
+                <a16:creationId xmlns:a16="http://schemas.microsoft.com/office/drawing/2014/main" id="{86BB3AA1-35AA-4C71-8069-5FAB12703749}"/>
               </a:ext>
             </a:extLst>
           </p:cNvPr>
@@ -6295,7 +6636,7 @@
           <p:cNvPr id="3" name="Espace réservé du contenu 2">
             <a:extLst>
               <a:ext uri="{FF2B5EF4-FFF2-40B4-BE49-F238E27FC236}">
-                <a16:creationId xmlns:a16="http://schemas.microsoft.com/office/drawing/2014/main" xmlns="" id="{09E46633-193E-494C-9CC9-34DD36DDD2BB}"/>
+                <a16:creationId xmlns:a16="http://schemas.microsoft.com/office/drawing/2014/main" id="{09E46633-193E-494C-9CC9-34DD36DDD2BB}"/>
               </a:ext>
             </a:extLst>
           </p:cNvPr>
@@ -6727,7 +7068,7 @@
           <p:cNvPr id="2" name="Titre 1">
             <a:extLst>
               <a:ext uri="{FF2B5EF4-FFF2-40B4-BE49-F238E27FC236}">
-                <a16:creationId xmlns:a16="http://schemas.microsoft.com/office/drawing/2014/main" xmlns="" id="{3CEDDC75-FA01-4670-85DD-0D9360DEDF39}"/>
+                <a16:creationId xmlns:a16="http://schemas.microsoft.com/office/drawing/2014/main" id="{3CEDDC75-FA01-4670-85DD-0D9360DEDF39}"/>
               </a:ext>
             </a:extLst>
           </p:cNvPr>
@@ -6755,7 +7096,7 @@
           <p:cNvPr id="3" name="Espace réservé du contenu 2">
             <a:extLst>
               <a:ext uri="{FF2B5EF4-FFF2-40B4-BE49-F238E27FC236}">
-                <a16:creationId xmlns:a16="http://schemas.microsoft.com/office/drawing/2014/main" xmlns="" id="{76EBCE99-093B-49B6-9F5A-9EE9E4349739}"/>
+                <a16:creationId xmlns:a16="http://schemas.microsoft.com/office/drawing/2014/main" id="{76EBCE99-093B-49B6-9F5A-9EE9E4349739}"/>
               </a:ext>
             </a:extLst>
           </p:cNvPr>
@@ -6780,38 +7121,17 @@
               <a:buNone/>
             </a:pPr>
             <a:r>
-              <a:rPr lang="fr-FR" dirty="0" smtClean="0"/>
-              <a:t>Le projet consiste à lancer </a:t>
-            </a:r>
-            <a:r>
-              <a:rPr lang="fr-FR" dirty="0" smtClean="0"/>
-              <a:t>un ballon météo </a:t>
-            </a:r>
-            <a:r>
-              <a:rPr lang="fr-FR" dirty="0" smtClean="0"/>
-              <a:t>qui embarquera un dispositif permettant de récupérer des données météorologique et </a:t>
-            </a:r>
-            <a:r>
-              <a:rPr lang="fr-FR" dirty="0" smtClean="0"/>
-              <a:t>de les </a:t>
-            </a:r>
-            <a:r>
-              <a:rPr lang="fr-FR" dirty="0" smtClean="0"/>
-              <a:t>transmettre via le protocole </a:t>
-            </a:r>
-            <a:r>
-              <a:rPr lang="fr-FR" dirty="0" err="1" smtClean="0"/>
+              <a:rPr lang="fr-FR" dirty="0"/>
+              <a:t>Le projet consiste à lancer un ballon météo qui embarquera un dispositif permettant de récupérer des données météorologique et de les transmettre via le protocole </a:t>
+            </a:r>
+            <a:r>
+              <a:rPr lang="fr-FR" dirty="0" err="1"/>
               <a:t>LoRaWAN</a:t>
             </a:r>
             <a:r>
-              <a:rPr lang="fr-FR" dirty="0" smtClean="0"/>
-              <a:t> à un serveur </a:t>
-            </a:r>
-            <a:r>
-              <a:rPr lang="fr-FR" dirty="0" smtClean="0"/>
-              <a:t>d’application  </a:t>
-            </a:r>
-            <a:endParaRPr lang="fr-FR" dirty="0"/>
+              <a:rPr lang="fr-FR" dirty="0"/>
+              <a:t> à un serveur d’application  </a:t>
+            </a:r>
           </a:p>
         </p:txBody>
       </p:sp>
@@ -7030,7 +7350,7 @@
           <p:cNvPr id="2" name="Titre 1">
             <a:extLst>
               <a:ext uri="{FF2B5EF4-FFF2-40B4-BE49-F238E27FC236}">
-                <a16:creationId xmlns:a16="http://schemas.microsoft.com/office/drawing/2014/main" xmlns="" id="{3CEDDC75-FA01-4670-85DD-0D9360DEDF39}"/>
+                <a16:creationId xmlns:a16="http://schemas.microsoft.com/office/drawing/2014/main" id="{3CEDDC75-FA01-4670-85DD-0D9360DEDF39}"/>
               </a:ext>
             </a:extLst>
           </p:cNvPr>
@@ -7055,7 +7375,13 @@
       </p:sp>
       <p:pic>
         <p:nvPicPr>
-          <p:cNvPr id="6" name="Espace réservé du contenu 5"/>
+          <p:cNvPr id="7" name="Espace réservé du contenu 6">
+            <a:extLst>
+              <a:ext uri="{FF2B5EF4-FFF2-40B4-BE49-F238E27FC236}">
+                <a16:creationId xmlns:a16="http://schemas.microsoft.com/office/drawing/2014/main" id="{048FB224-4965-3642-BDE5-B83E22A8E41C}"/>
+              </a:ext>
+            </a:extLst>
+          </p:cNvPr>
           <p:cNvPicPr>
             <a:picLocks noGrp="1" noChangeAspect="1"/>
           </p:cNvPicPr>
@@ -7064,24 +7390,65 @@
           </p:nvPr>
         </p:nvPicPr>
         <p:blipFill>
-          <a:blip r:embed="rId2">
-            <a:extLst>
-              <a:ext uri="{28A0092B-C50C-407E-A947-70E740481C1C}">
-                <a14:useLocalDpi xmlns:a14="http://schemas.microsoft.com/office/drawing/2010/main" val="0"/>
-              </a:ext>
-            </a:extLst>
-          </a:blip>
+          <a:blip r:embed="rId2"/>
           <a:stretch>
             <a:fillRect/>
           </a:stretch>
         </p:blipFill>
         <p:spPr>
           <a:xfrm>
-            <a:off x="1531780" y="1326280"/>
-            <a:ext cx="8874092" cy="5324456"/>
+            <a:off x="3309962" y="1638794"/>
+            <a:ext cx="6594343" cy="4766487"/>
           </a:xfrm>
         </p:spPr>
       </p:pic>
+      <p:sp>
+        <p:nvSpPr>
+          <p:cNvPr id="8" name="ZoneTexte 7">
+            <a:extLst>
+              <a:ext uri="{FF2B5EF4-FFF2-40B4-BE49-F238E27FC236}">
+                <a16:creationId xmlns:a16="http://schemas.microsoft.com/office/drawing/2014/main" id="{15821D4A-07E0-BB47-97F4-16DB276E97B9}"/>
+              </a:ext>
+            </a:extLst>
+          </p:cNvPr>
+          <p:cNvSpPr txBox="1"/>
+          <p:nvPr/>
+        </p:nvSpPr>
+        <p:spPr>
+          <a:xfrm>
+            <a:off x="955769" y="1483916"/>
+            <a:ext cx="2663851" cy="369332"/>
+          </a:xfrm>
+          <a:prstGeom prst="rect">
+            <a:avLst/>
+          </a:prstGeom>
+          <a:noFill/>
+        </p:spPr>
+        <p:txBody>
+          <a:bodyPr wrap="square" rtlCol="0">
+            <a:spAutoFit/>
+          </a:bodyPr>
+          <a:lstStyle/>
+          <a:p>
+            <a:r>
+              <a:rPr lang="fr-FR" dirty="0" err="1"/>
+              <a:t>Schema</a:t>
+            </a:r>
+            <a:r>
+              <a:rPr lang="fr-FR" dirty="0"/>
+              <a:t> </a:t>
+            </a:r>
+            <a:r>
+              <a:rPr lang="fr-FR" dirty="0" err="1"/>
+              <a:t>cablage</a:t>
+            </a:r>
+            <a:r>
+              <a:rPr lang="fr-FR" dirty="0"/>
+              <a:t> </a:t>
+            </a:r>
+          </a:p>
+        </p:txBody>
+      </p:sp>
     </p:spTree>
     <p:extLst>
       <p:ext uri="{BB962C8B-B14F-4D97-AF65-F5344CB8AC3E}">
@@ -7203,7 +7570,7 @@
           <p:cNvPr id="2" name="Titre 1">
             <a:extLst>
               <a:ext uri="{FF2B5EF4-FFF2-40B4-BE49-F238E27FC236}">
-                <a16:creationId xmlns:a16="http://schemas.microsoft.com/office/drawing/2014/main" xmlns="" id="{DFA0330B-40DD-4810-AE1C-E02D89006FC2}"/>
+                <a16:creationId xmlns:a16="http://schemas.microsoft.com/office/drawing/2014/main" id="{3CEDDC75-FA01-4670-85DD-0D9360DEDF39}"/>
               </a:ext>
             </a:extLst>
           </p:cNvPr>
@@ -7221,6 +7588,521 @@
           <a:p>
             <a:r>
               <a:rPr lang="fr-FR" dirty="0"/>
+              <a:t>CODE DU SYSTEME</a:t>
+            </a:r>
+          </a:p>
+        </p:txBody>
+      </p:sp>
+      <p:sp>
+        <p:nvSpPr>
+          <p:cNvPr id="9" name="ZoneTexte 8">
+            <a:extLst>
+              <a:ext uri="{FF2B5EF4-FFF2-40B4-BE49-F238E27FC236}">
+                <a16:creationId xmlns:a16="http://schemas.microsoft.com/office/drawing/2014/main" id="{FFE3F28F-B8D6-E247-AF8C-F71462A3CD18}"/>
+              </a:ext>
+            </a:extLst>
+          </p:cNvPr>
+          <p:cNvSpPr txBox="1"/>
+          <p:nvPr/>
+        </p:nvSpPr>
+        <p:spPr>
+          <a:xfrm>
+            <a:off x="345257" y="1666840"/>
+            <a:ext cx="3063834" cy="369332"/>
+          </a:xfrm>
+          <a:prstGeom prst="rect">
+            <a:avLst/>
+          </a:prstGeom>
+          <a:noFill/>
+        </p:spPr>
+        <p:txBody>
+          <a:bodyPr wrap="square" rtlCol="0">
+            <a:spAutoFit/>
+          </a:bodyPr>
+          <a:lstStyle/>
+          <a:p>
+            <a:r>
+              <a:rPr lang="fr-FR" dirty="0"/>
+              <a:t>Du </a:t>
+            </a:r>
+            <a:r>
+              <a:rPr lang="fr-FR" dirty="0" err="1"/>
+              <a:t>uno</a:t>
+            </a:r>
+            <a:r>
+              <a:rPr lang="fr-FR" dirty="0"/>
+              <a:t> vers le mini</a:t>
+            </a:r>
+          </a:p>
+        </p:txBody>
+      </p:sp>
+      <p:pic>
+        <p:nvPicPr>
+          <p:cNvPr id="7" name="Espace réservé du contenu 6">
+            <a:extLst>
+              <a:ext uri="{FF2B5EF4-FFF2-40B4-BE49-F238E27FC236}">
+                <a16:creationId xmlns:a16="http://schemas.microsoft.com/office/drawing/2014/main" id="{F0E50910-CE5D-9C4A-ABFA-3C8813667995}"/>
+              </a:ext>
+            </a:extLst>
+          </p:cNvPr>
+          <p:cNvPicPr>
+            <a:picLocks noGrp="1" noChangeAspect="1"/>
+          </p:cNvPicPr>
+          <p:nvPr>
+            <p:ph idx="1"/>
+          </p:nvPr>
+        </p:nvPicPr>
+        <p:blipFill>
+          <a:blip r:embed="rId2"/>
+          <a:stretch>
+            <a:fillRect/>
+          </a:stretch>
+        </p:blipFill>
+        <p:spPr>
+          <a:xfrm>
+            <a:off x="4995319" y="1472540"/>
+            <a:ext cx="5905182" cy="3524437"/>
+          </a:xfrm>
+        </p:spPr>
+      </p:pic>
+      <p:sp>
+        <p:nvSpPr>
+          <p:cNvPr id="8" name="ZoneTexte 7">
+            <a:extLst>
+              <a:ext uri="{FF2B5EF4-FFF2-40B4-BE49-F238E27FC236}">
+                <a16:creationId xmlns:a16="http://schemas.microsoft.com/office/drawing/2014/main" id="{0CBE8024-319C-7D4A-9FC9-F793EE03F2F8}"/>
+              </a:ext>
+            </a:extLst>
+          </p:cNvPr>
+          <p:cNvSpPr txBox="1"/>
+          <p:nvPr/>
+        </p:nvSpPr>
+        <p:spPr>
+          <a:xfrm>
+            <a:off x="326571" y="2219095"/>
+            <a:ext cx="4239491" cy="2031325"/>
+          </a:xfrm>
+          <a:prstGeom prst="rect">
+            <a:avLst/>
+          </a:prstGeom>
+          <a:noFill/>
+        </p:spPr>
+        <p:txBody>
+          <a:bodyPr wrap="square" rtlCol="0">
+            <a:spAutoFit/>
+          </a:bodyPr>
+          <a:lstStyle/>
+          <a:p>
+            <a:r>
+              <a:rPr lang="fr-FR" dirty="0"/>
+              <a:t>L’arduino Uno récupère les données du shield et les transfert, tout les données capté sont concaténés dans une chaîne de caractères qui ensuite est transmise lettres par lettres via TTL avec la librairie </a:t>
+            </a:r>
+            <a:r>
+              <a:rPr lang="fr-FR" dirty="0" err="1"/>
+              <a:t>SoftwareSerial</a:t>
+            </a:r>
+            <a:endParaRPr lang="fr-FR" dirty="0"/>
+          </a:p>
+        </p:txBody>
+      </p:sp>
+    </p:spTree>
+    <p:extLst>
+      <p:ext uri="{BB962C8B-B14F-4D97-AF65-F5344CB8AC3E}">
+        <p14:creationId xmlns:p14="http://schemas.microsoft.com/office/powerpoint/2010/main" val="664001966"/>
+      </p:ext>
+    </p:extLst>
+  </p:cSld>
+  <p:clrMapOvr>
+    <a:masterClrMapping/>
+  </p:clrMapOvr>
+  <p:timing>
+    <p:tnLst>
+      <p:par>
+        <p:cTn id="1" dur="indefinite" restart="never" nodeType="tmRoot">
+          <p:childTnLst>
+            <p:seq concurrent="1" nextAc="seek">
+              <p:cTn id="2" dur="indefinite" nodeType="mainSeq">
+                <p:childTnLst>
+                  <p:par>
+                    <p:cTn id="3" fill="hold">
+                      <p:stCondLst>
+                        <p:cond delay="indefinite"/>
+                      </p:stCondLst>
+                      <p:childTnLst>
+                        <p:par>
+                          <p:cTn id="4" fill="hold">
+                            <p:stCondLst>
+                              <p:cond delay="0"/>
+                            </p:stCondLst>
+                            <p:childTnLst>
+                              <p:par>
+                                <p:cTn id="5" presetID="10" presetClass="entr" presetSubtype="0" fill="hold" grpId="0" nodeType="clickEffect">
+                                  <p:stCondLst>
+                                    <p:cond delay="0"/>
+                                  </p:stCondLst>
+                                  <p:childTnLst>
+                                    <p:set>
+                                      <p:cBhvr>
+                                        <p:cTn id="6" dur="1" fill="hold">
+                                          <p:stCondLst>
+                                            <p:cond delay="0"/>
+                                          </p:stCondLst>
+                                        </p:cTn>
+                                        <p:tgtEl>
+                                          <p:spTgt spid="2"/>
+                                        </p:tgtEl>
+                                        <p:attrNameLst>
+                                          <p:attrName>style.visibility</p:attrName>
+                                        </p:attrNameLst>
+                                      </p:cBhvr>
+                                      <p:to>
+                                        <p:strVal val="visible"/>
+                                      </p:to>
+                                    </p:set>
+                                    <p:animEffect transition="in" filter="fade">
+                                      <p:cBhvr>
+                                        <p:cTn id="7" dur="500"/>
+                                        <p:tgtEl>
+                                          <p:spTgt spid="2"/>
+                                        </p:tgtEl>
+                                      </p:cBhvr>
+                                    </p:animEffect>
+                                  </p:childTnLst>
+                                </p:cTn>
+                              </p:par>
+                            </p:childTnLst>
+                          </p:cTn>
+                        </p:par>
+                      </p:childTnLst>
+                    </p:cTn>
+                  </p:par>
+                </p:childTnLst>
+              </p:cTn>
+              <p:prevCondLst>
+                <p:cond evt="onPrev" delay="0">
+                  <p:tgtEl>
+                    <p:sldTgt/>
+                  </p:tgtEl>
+                </p:cond>
+              </p:prevCondLst>
+              <p:nextCondLst>
+                <p:cond evt="onNext" delay="0">
+                  <p:tgtEl>
+                    <p:sldTgt/>
+                  </p:tgtEl>
+                </p:cond>
+              </p:nextCondLst>
+            </p:seq>
+          </p:childTnLst>
+        </p:cTn>
+      </p:par>
+    </p:tnLst>
+    <p:bldLst>
+      <p:bldP spid="2" grpId="0"/>
+    </p:bldLst>
+  </p:timing>
+</p:sld>
+</file>
+
+<file path=ppt/slides/slide6.xml><?xml version="1.0" encoding="utf-8"?>
+<p:sld xmlns:a="http://schemas.openxmlformats.org/drawingml/2006/main" xmlns:r="http://schemas.openxmlformats.org/officeDocument/2006/relationships" xmlns:p="http://schemas.openxmlformats.org/presentationml/2006/main">
+  <p:cSld>
+    <p:spTree>
+      <p:nvGrpSpPr>
+        <p:cNvPr id="1" name=""/>
+        <p:cNvGrpSpPr/>
+        <p:nvPr/>
+      </p:nvGrpSpPr>
+      <p:grpSpPr>
+        <a:xfrm>
+          <a:off x="0" y="0"/>
+          <a:ext cx="0" cy="0"/>
+          <a:chOff x="0" y="0"/>
+          <a:chExt cx="0" cy="0"/>
+        </a:xfrm>
+      </p:grpSpPr>
+      <p:sp>
+        <p:nvSpPr>
+          <p:cNvPr id="2" name="Titre 1">
+            <a:extLst>
+              <a:ext uri="{FF2B5EF4-FFF2-40B4-BE49-F238E27FC236}">
+                <a16:creationId xmlns:a16="http://schemas.microsoft.com/office/drawing/2014/main" id="{3CEDDC75-FA01-4670-85DD-0D9360DEDF39}"/>
+              </a:ext>
+            </a:extLst>
+          </p:cNvPr>
+          <p:cNvSpPr>
+            <a:spLocks noGrp="1"/>
+          </p:cNvSpPr>
+          <p:nvPr>
+            <p:ph type="title"/>
+          </p:nvPr>
+        </p:nvSpPr>
+        <p:spPr/>
+        <p:txBody>
+          <a:bodyPr/>
+          <a:lstStyle/>
+          <a:p>
+            <a:r>
+              <a:rPr lang="fr-FR" dirty="0"/>
+              <a:t>CODE DU SYSTEME</a:t>
+            </a:r>
+          </a:p>
+        </p:txBody>
+      </p:sp>
+      <p:pic>
+        <p:nvPicPr>
+          <p:cNvPr id="6" name="Espace réservé du contenu 5">
+            <a:extLst>
+              <a:ext uri="{FF2B5EF4-FFF2-40B4-BE49-F238E27FC236}">
+                <a16:creationId xmlns:a16="http://schemas.microsoft.com/office/drawing/2014/main" id="{7E8A80BF-ACBC-9843-AB15-CA87DC120813}"/>
+              </a:ext>
+            </a:extLst>
+          </p:cNvPr>
+          <p:cNvPicPr>
+            <a:picLocks noGrp="1" noChangeAspect="1"/>
+          </p:cNvPicPr>
+          <p:nvPr>
+            <p:ph idx="1"/>
+          </p:nvPr>
+        </p:nvPicPr>
+        <p:blipFill>
+          <a:blip r:embed="rId2"/>
+          <a:stretch>
+            <a:fillRect/>
+          </a:stretch>
+        </p:blipFill>
+        <p:spPr>
+          <a:xfrm>
+            <a:off x="3384468" y="1494398"/>
+            <a:ext cx="4763552" cy="5084414"/>
+          </a:xfrm>
+        </p:spPr>
+      </p:pic>
+      <p:sp>
+        <p:nvSpPr>
+          <p:cNvPr id="9" name="ZoneTexte 8">
+            <a:extLst>
+              <a:ext uri="{FF2B5EF4-FFF2-40B4-BE49-F238E27FC236}">
+                <a16:creationId xmlns:a16="http://schemas.microsoft.com/office/drawing/2014/main" id="{FFE3F28F-B8D6-E247-AF8C-F71462A3CD18}"/>
+              </a:ext>
+            </a:extLst>
+          </p:cNvPr>
+          <p:cNvSpPr txBox="1"/>
+          <p:nvPr/>
+        </p:nvSpPr>
+        <p:spPr>
+          <a:xfrm>
+            <a:off x="269616" y="1309732"/>
+            <a:ext cx="3491348" cy="369332"/>
+          </a:xfrm>
+          <a:prstGeom prst="rect">
+            <a:avLst/>
+          </a:prstGeom>
+          <a:noFill/>
+        </p:spPr>
+        <p:txBody>
+          <a:bodyPr wrap="square" rtlCol="0">
+            <a:spAutoFit/>
+          </a:bodyPr>
+          <a:lstStyle/>
+          <a:p>
+            <a:r>
+              <a:rPr lang="fr-FR" dirty="0"/>
+              <a:t>Du mini vers la </a:t>
+            </a:r>
+            <a:r>
+              <a:rPr lang="fr-FR" dirty="0" err="1"/>
+              <a:t>GateWay</a:t>
+            </a:r>
+            <a:endParaRPr lang="fr-FR" dirty="0"/>
+          </a:p>
+        </p:txBody>
+      </p:sp>
+      <p:sp>
+        <p:nvSpPr>
+          <p:cNvPr id="10" name="ZoneTexte 9">
+            <a:extLst>
+              <a:ext uri="{FF2B5EF4-FFF2-40B4-BE49-F238E27FC236}">
+                <a16:creationId xmlns:a16="http://schemas.microsoft.com/office/drawing/2014/main" id="{8065DD95-335E-2949-8584-985A59B3990C}"/>
+              </a:ext>
+            </a:extLst>
+          </p:cNvPr>
+          <p:cNvSpPr txBox="1"/>
+          <p:nvPr/>
+        </p:nvSpPr>
+        <p:spPr>
+          <a:xfrm>
+            <a:off x="269616" y="2137558"/>
+            <a:ext cx="2924846" cy="3693319"/>
+          </a:xfrm>
+          <a:prstGeom prst="rect">
+            <a:avLst/>
+          </a:prstGeom>
+          <a:noFill/>
+        </p:spPr>
+        <p:txBody>
+          <a:bodyPr wrap="square" rtlCol="0">
+            <a:spAutoFit/>
+          </a:bodyPr>
+          <a:lstStyle/>
+          <a:p>
+            <a:r>
+              <a:rPr lang="fr-FR" dirty="0"/>
+              <a:t>L’arduino mini reçoit les caractères un à un et les concatène dans une String via </a:t>
+            </a:r>
+            <a:r>
+              <a:rPr lang="fr-FR" dirty="0" err="1"/>
+              <a:t>SoftwareSerial</a:t>
+            </a:r>
+            <a:endParaRPr lang="fr-FR" dirty="0"/>
+          </a:p>
+          <a:p>
+            <a:r>
+              <a:rPr lang="fr-FR" dirty="0"/>
+              <a:t>Et dès que le mini reçoit le caractère ‘E’ il réinitialise la String et commence à concaténer les lettres, une fois la taille attendu atteinte on insère la String dans un tableau de Char </a:t>
+            </a:r>
+          </a:p>
+        </p:txBody>
+      </p:sp>
+    </p:spTree>
+    <p:extLst>
+      <p:ext uri="{BB962C8B-B14F-4D97-AF65-F5344CB8AC3E}">
+        <p14:creationId xmlns:p14="http://schemas.microsoft.com/office/powerpoint/2010/main" val="1150503933"/>
+      </p:ext>
+    </p:extLst>
+  </p:cSld>
+  <p:clrMapOvr>
+    <a:masterClrMapping/>
+  </p:clrMapOvr>
+  <p:timing>
+    <p:tnLst>
+      <p:par>
+        <p:cTn id="1" dur="indefinite" restart="never" nodeType="tmRoot">
+          <p:childTnLst>
+            <p:seq concurrent="1" nextAc="seek">
+              <p:cTn id="2" dur="indefinite" nodeType="mainSeq">
+                <p:childTnLst>
+                  <p:par>
+                    <p:cTn id="3" fill="hold">
+                      <p:stCondLst>
+                        <p:cond delay="indefinite"/>
+                      </p:stCondLst>
+                      <p:childTnLst>
+                        <p:par>
+                          <p:cTn id="4" fill="hold">
+                            <p:stCondLst>
+                              <p:cond delay="0"/>
+                            </p:stCondLst>
+                            <p:childTnLst>
+                              <p:par>
+                                <p:cTn id="5" presetID="10" presetClass="entr" presetSubtype="0" fill="hold" grpId="0" nodeType="clickEffect">
+                                  <p:stCondLst>
+                                    <p:cond delay="0"/>
+                                  </p:stCondLst>
+                                  <p:childTnLst>
+                                    <p:set>
+                                      <p:cBhvr>
+                                        <p:cTn id="6" dur="1" fill="hold">
+                                          <p:stCondLst>
+                                            <p:cond delay="0"/>
+                                          </p:stCondLst>
+                                        </p:cTn>
+                                        <p:tgtEl>
+                                          <p:spTgt spid="2"/>
+                                        </p:tgtEl>
+                                        <p:attrNameLst>
+                                          <p:attrName>style.visibility</p:attrName>
+                                        </p:attrNameLst>
+                                      </p:cBhvr>
+                                      <p:to>
+                                        <p:strVal val="visible"/>
+                                      </p:to>
+                                    </p:set>
+                                    <p:animEffect transition="in" filter="fade">
+                                      <p:cBhvr>
+                                        <p:cTn id="7" dur="500"/>
+                                        <p:tgtEl>
+                                          <p:spTgt spid="2"/>
+                                        </p:tgtEl>
+                                      </p:cBhvr>
+                                    </p:animEffect>
+                                  </p:childTnLst>
+                                </p:cTn>
+                              </p:par>
+                            </p:childTnLst>
+                          </p:cTn>
+                        </p:par>
+                      </p:childTnLst>
+                    </p:cTn>
+                  </p:par>
+                </p:childTnLst>
+              </p:cTn>
+              <p:prevCondLst>
+                <p:cond evt="onPrev" delay="0">
+                  <p:tgtEl>
+                    <p:sldTgt/>
+                  </p:tgtEl>
+                </p:cond>
+              </p:prevCondLst>
+              <p:nextCondLst>
+                <p:cond evt="onNext" delay="0">
+                  <p:tgtEl>
+                    <p:sldTgt/>
+                  </p:tgtEl>
+                </p:cond>
+              </p:nextCondLst>
+            </p:seq>
+          </p:childTnLst>
+        </p:cTn>
+      </p:par>
+    </p:tnLst>
+    <p:bldLst>
+      <p:bldP spid="2" grpId="0"/>
+    </p:bldLst>
+  </p:timing>
+</p:sld>
+</file>
+
+<file path=ppt/slides/slide7.xml><?xml version="1.0" encoding="utf-8"?>
+<p:sld xmlns:a="http://schemas.openxmlformats.org/drawingml/2006/main" xmlns:r="http://schemas.openxmlformats.org/officeDocument/2006/relationships" xmlns:p="http://schemas.openxmlformats.org/presentationml/2006/main">
+  <p:cSld>
+    <p:spTree>
+      <p:nvGrpSpPr>
+        <p:cNvPr id="1" name=""/>
+        <p:cNvGrpSpPr/>
+        <p:nvPr/>
+      </p:nvGrpSpPr>
+      <p:grpSpPr>
+        <a:xfrm>
+          <a:off x="0" y="0"/>
+          <a:ext cx="0" cy="0"/>
+          <a:chOff x="0" y="0"/>
+          <a:chExt cx="0" cy="0"/>
+        </a:xfrm>
+      </p:grpSpPr>
+      <p:sp>
+        <p:nvSpPr>
+          <p:cNvPr id="2" name="Titre 1">
+            <a:extLst>
+              <a:ext uri="{FF2B5EF4-FFF2-40B4-BE49-F238E27FC236}">
+                <a16:creationId xmlns:a16="http://schemas.microsoft.com/office/drawing/2014/main" id="{DFA0330B-40DD-4810-AE1C-E02D89006FC2}"/>
+              </a:ext>
+            </a:extLst>
+          </p:cNvPr>
+          <p:cNvSpPr>
+            <a:spLocks noGrp="1"/>
+          </p:cNvSpPr>
+          <p:nvPr>
+            <p:ph type="title"/>
+          </p:nvPr>
+        </p:nvSpPr>
+        <p:spPr/>
+        <p:txBody>
+          <a:bodyPr/>
+          <a:lstStyle/>
+          <a:p>
+            <a:r>
+              <a:rPr lang="fr-FR" dirty="0"/>
               <a:t>Quels sont nos objectifs ?</a:t>
             </a:r>
           </a:p>
@@ -7231,7 +8113,7 @@
           <p:cNvPr id="3" name="Espace réservé du contenu 2">
             <a:extLst>
               <a:ext uri="{FF2B5EF4-FFF2-40B4-BE49-F238E27FC236}">
-                <a16:creationId xmlns:a16="http://schemas.microsoft.com/office/drawing/2014/main" xmlns="" id="{A7C2B056-D511-4F3A-8BE4-B39B68D5BB20}"/>
+                <a16:creationId xmlns:a16="http://schemas.microsoft.com/office/drawing/2014/main" id="{A7C2B056-D511-4F3A-8BE4-B39B68D5BB20}"/>
               </a:ext>
             </a:extLst>
           </p:cNvPr>
@@ -7248,24 +8130,24 @@
           <a:lstStyle/>
           <a:p>
             <a:r>
-              <a:rPr lang="fr-FR" dirty="0" smtClean="0"/>
+              <a:rPr lang="fr-FR" dirty="0"/>
               <a:t>Un système embarqué de poids réduit </a:t>
             </a:r>
           </a:p>
           <a:p>
             <a:r>
-              <a:rPr lang="fr-FR" dirty="0" smtClean="0"/>
+              <a:rPr lang="fr-FR" dirty="0"/>
               <a:t>Gestion de l’alimentation et apports en énergie</a:t>
             </a:r>
           </a:p>
           <a:p>
             <a:r>
-              <a:rPr lang="fr-FR" dirty="0" smtClean="0"/>
+              <a:rPr lang="fr-FR" dirty="0"/>
               <a:t>Utilisation des données récolté par le système  </a:t>
             </a:r>
           </a:p>
           <a:p>
-            <a:endParaRPr lang="fr-FR" dirty="0" smtClean="0"/>
+            <a:endParaRPr lang="fr-FR" dirty="0"/>
           </a:p>
         </p:txBody>
       </p:sp>
@@ -7552,7 +8434,7 @@
 </p:sld>
 </file>
 
-<file path=ppt/slides/slide6.xml><?xml version="1.0" encoding="utf-8"?>
+<file path=ppt/slides/slide8.xml><?xml version="1.0" encoding="utf-8"?>
 <p:sld xmlns:a="http://schemas.openxmlformats.org/drawingml/2006/main" xmlns:r="http://schemas.openxmlformats.org/officeDocument/2006/relationships" xmlns:p="http://schemas.openxmlformats.org/presentationml/2006/main">
   <p:cSld>
     <p:spTree>
@@ -7574,7 +8456,7 @@
           <p:cNvPr id="2" name="Titre 1">
             <a:extLst>
               <a:ext uri="{FF2B5EF4-FFF2-40B4-BE49-F238E27FC236}">
-                <a16:creationId xmlns:a16="http://schemas.microsoft.com/office/drawing/2014/main" xmlns="" id="{5AE92176-05D7-4878-967B-433628B2F204}"/>
+                <a16:creationId xmlns:a16="http://schemas.microsoft.com/office/drawing/2014/main" id="{5AE92176-05D7-4878-967B-433628B2F204}"/>
               </a:ext>
             </a:extLst>
           </p:cNvPr>
@@ -7779,7 +8661,7 @@
 </p:sld>
 </file>
 
-<file path=ppt/slides/slide7.xml><?xml version="1.0" encoding="utf-8"?>
+<file path=ppt/slides/slide9.xml><?xml version="1.0" encoding="utf-8"?>
 <p:sld xmlns:a="http://schemas.openxmlformats.org/drawingml/2006/main" xmlns:r="http://schemas.openxmlformats.org/officeDocument/2006/relationships" xmlns:p="http://schemas.openxmlformats.org/presentationml/2006/main">
   <p:cSld>
     <p:spTree>
@@ -7801,7 +8683,7 @@
           <p:cNvPr id="2" name="Titre 1">
             <a:extLst>
               <a:ext uri="{FF2B5EF4-FFF2-40B4-BE49-F238E27FC236}">
-                <a16:creationId xmlns:a16="http://schemas.microsoft.com/office/drawing/2014/main" xmlns="" id="{5AE92176-05D7-4878-967B-433628B2F204}"/>
+                <a16:creationId xmlns:a16="http://schemas.microsoft.com/office/drawing/2014/main" id="{5AE92176-05D7-4878-967B-433628B2F204}"/>
               </a:ext>
             </a:extLst>
           </p:cNvPr>
@@ -7863,277 +8745,6 @@
   <p:clrMapOvr>
     <a:masterClrMapping/>
   </p:clrMapOvr>
-  <p:timing>
-    <p:tnLst>
-      <p:par>
-        <p:cTn id="1" dur="indefinite" restart="never" nodeType="tmRoot"/>
-      </p:par>
-    </p:tnLst>
-  </p:timing>
-</p:sld>
-</file>
-
-<file path=ppt/slides/slide8.xml><?xml version="1.0" encoding="utf-8"?>
-<p:sld xmlns:a="http://schemas.openxmlformats.org/drawingml/2006/main" xmlns:r="http://schemas.openxmlformats.org/officeDocument/2006/relationships" xmlns:p="http://schemas.openxmlformats.org/presentationml/2006/main">
-  <p:cSld>
-    <p:spTree>
-      <p:nvGrpSpPr>
-        <p:cNvPr id="1" name=""/>
-        <p:cNvGrpSpPr/>
-        <p:nvPr/>
-      </p:nvGrpSpPr>
-      <p:grpSpPr>
-        <a:xfrm>
-          <a:off x="0" y="0"/>
-          <a:ext cx="0" cy="0"/>
-          <a:chOff x="0" y="0"/>
-          <a:chExt cx="0" cy="0"/>
-        </a:xfrm>
-      </p:grpSpPr>
-      <p:sp>
-        <p:nvSpPr>
-          <p:cNvPr id="2" name="Titre 1">
-            <a:extLst>
-              <a:ext uri="{FF2B5EF4-FFF2-40B4-BE49-F238E27FC236}">
-                <a16:creationId xmlns:a16="http://schemas.microsoft.com/office/drawing/2014/main" xmlns="" id="{5AE92176-05D7-4878-967B-433628B2F204}"/>
-              </a:ext>
-            </a:extLst>
-          </p:cNvPr>
-          <p:cNvSpPr>
-            <a:spLocks noGrp="1"/>
-          </p:cNvSpPr>
-          <p:nvPr>
-            <p:ph type="title"/>
-          </p:nvPr>
-        </p:nvSpPr>
-        <p:spPr/>
-        <p:txBody>
-          <a:bodyPr/>
-          <a:lstStyle/>
-          <a:p>
-            <a:r>
-              <a:rPr lang="fr-FR" dirty="0"/>
-              <a:t>Planning du travail</a:t>
-            </a:r>
-          </a:p>
-        </p:txBody>
-      </p:sp>
-      <p:pic>
-        <p:nvPicPr>
-          <p:cNvPr id="4" name="Espace réservé du contenu 3"/>
-          <p:cNvPicPr>
-            <a:picLocks noGrp="1" noChangeAspect="1"/>
-          </p:cNvPicPr>
-          <p:nvPr>
-            <p:ph idx="1"/>
-          </p:nvPr>
-        </p:nvPicPr>
-        <p:blipFill>
-          <a:blip r:embed="rId2">
-            <a:extLst>
-              <a:ext uri="{28A0092B-C50C-407E-A947-70E740481C1C}">
-                <a14:useLocalDpi xmlns:a14="http://schemas.microsoft.com/office/drawing/2010/main" val="0"/>
-              </a:ext>
-            </a:extLst>
-          </a:blip>
-          <a:stretch>
-            <a:fillRect/>
-          </a:stretch>
-        </p:blipFill>
-        <p:spPr>
-          <a:xfrm>
-            <a:off x="646111" y="2248525"/>
-            <a:ext cx="10428593" cy="3462081"/>
-          </a:xfrm>
-        </p:spPr>
-      </p:pic>
-    </p:spTree>
-    <p:extLst>
-      <p:ext uri="{BB962C8B-B14F-4D97-AF65-F5344CB8AC3E}">
-        <p14:creationId xmlns:p14="http://schemas.microsoft.com/office/powerpoint/2010/main" val="64445786"/>
-      </p:ext>
-    </p:extLst>
-  </p:cSld>
-  <p:clrMapOvr>
-    <a:masterClrMapping/>
-  </p:clrMapOvr>
-  <p:timing>
-    <p:tnLst>
-      <p:par>
-        <p:cTn id="1" dur="indefinite" restart="never" nodeType="tmRoot"/>
-      </p:par>
-    </p:tnLst>
-  </p:timing>
-</p:sld>
-</file>
-
-<file path=ppt/slides/slide9.xml><?xml version="1.0" encoding="utf-8"?>
-<p:sld xmlns:a="http://schemas.openxmlformats.org/drawingml/2006/main" xmlns:r="http://schemas.openxmlformats.org/officeDocument/2006/relationships" xmlns:p="http://schemas.openxmlformats.org/presentationml/2006/main">
-  <p:cSld>
-    <p:spTree>
-      <p:nvGrpSpPr>
-        <p:cNvPr id="1" name=""/>
-        <p:cNvGrpSpPr/>
-        <p:nvPr/>
-      </p:nvGrpSpPr>
-      <p:grpSpPr>
-        <a:xfrm>
-          <a:off x="0" y="0"/>
-          <a:ext cx="0" cy="0"/>
-          <a:chOff x="0" y="0"/>
-          <a:chExt cx="0" cy="0"/>
-        </a:xfrm>
-      </p:grpSpPr>
-      <p:sp>
-        <p:nvSpPr>
-          <p:cNvPr id="2" name="Titre 1">
-            <a:extLst>
-              <a:ext uri="{FF2B5EF4-FFF2-40B4-BE49-F238E27FC236}">
-                <a16:creationId xmlns:a16="http://schemas.microsoft.com/office/drawing/2014/main" xmlns="" id="{ED8DFBD5-2E68-4F5F-B291-4D6060674A26}"/>
-              </a:ext>
-            </a:extLst>
-          </p:cNvPr>
-          <p:cNvSpPr>
-            <a:spLocks noGrp="1"/>
-          </p:cNvSpPr>
-          <p:nvPr>
-            <p:ph type="title"/>
-          </p:nvPr>
-        </p:nvSpPr>
-        <p:spPr/>
-        <p:txBody>
-          <a:bodyPr/>
-          <a:lstStyle/>
-          <a:p>
-            <a:r>
-              <a:rPr lang="fr-FR" dirty="0"/>
-              <a:t>Répartition du travail</a:t>
-            </a:r>
-          </a:p>
-        </p:txBody>
-      </p:sp>
-      <p:pic>
-        <p:nvPicPr>
-          <p:cNvPr id="7" name="Espace réservé du contenu 6"/>
-          <p:cNvPicPr>
-            <a:picLocks noGrp="1" noChangeAspect="1"/>
-          </p:cNvPicPr>
-          <p:nvPr>
-            <p:ph idx="1"/>
-          </p:nvPr>
-        </p:nvPicPr>
-        <p:blipFill>
-          <a:blip r:embed="rId2">
-            <a:extLst>
-              <a:ext uri="{28A0092B-C50C-407E-A947-70E740481C1C}">
-                <a14:useLocalDpi xmlns:a14="http://schemas.microsoft.com/office/drawing/2010/main" val="0"/>
-              </a:ext>
-            </a:extLst>
-          </a:blip>
-          <a:stretch>
-            <a:fillRect/>
-          </a:stretch>
-        </p:blipFill>
-        <p:spPr>
-          <a:xfrm>
-            <a:off x="2073427" y="2052638"/>
-            <a:ext cx="7006922" cy="4195762"/>
-          </a:xfrm>
-        </p:spPr>
-      </p:pic>
-    </p:spTree>
-    <p:extLst>
-      <p:ext uri="{BB962C8B-B14F-4D97-AF65-F5344CB8AC3E}">
-        <p14:creationId xmlns:p14="http://schemas.microsoft.com/office/powerpoint/2010/main" val="1088639980"/>
-      </p:ext>
-    </p:extLst>
-  </p:cSld>
-  <p:clrMapOvr>
-    <a:masterClrMapping/>
-  </p:clrMapOvr>
-  <p:timing>
-    <p:tnLst>
-      <p:par>
-        <p:cTn id="1" dur="indefinite" restart="never" nodeType="tmRoot">
-          <p:childTnLst>
-            <p:seq concurrent="1" nextAc="seek">
-              <p:cTn id="2" dur="indefinite" nodeType="mainSeq">
-                <p:childTnLst>
-                  <p:par>
-                    <p:cTn id="3" fill="hold">
-                      <p:stCondLst>
-                        <p:cond delay="indefinite"/>
-                      </p:stCondLst>
-                      <p:childTnLst>
-                        <p:par>
-                          <p:cTn id="4" fill="hold">
-                            <p:stCondLst>
-                              <p:cond delay="0"/>
-                            </p:stCondLst>
-                            <p:childTnLst>
-                              <p:par>
-                                <p:cTn id="5" presetID="10" presetClass="entr" presetSubtype="0" fill="hold" nodeType="clickEffect">
-                                  <p:stCondLst>
-                                    <p:cond delay="0"/>
-                                  </p:stCondLst>
-                                  <p:childTnLst>
-                                    <p:set>
-                                      <p:cBhvr>
-                                        <p:cTn id="6" dur="1" fill="hold">
-                                          <p:stCondLst>
-                                            <p:cond delay="0"/>
-                                          </p:stCondLst>
-                                        </p:cTn>
-                                        <p:tgtEl>
-                                          <p:spTgt spid="7"/>
-                                        </p:tgtEl>
-                                        <p:attrNameLst>
-                                          <p:attrName>style.visibility</p:attrName>
-                                        </p:attrNameLst>
-                                      </p:cBhvr>
-                                      <p:to>
-                                        <p:strVal val="visible"/>
-                                      </p:to>
-                                    </p:set>
-                                    <p:animEffect transition="in" filter="fade">
-                                      <p:cBhvr>
-                                        <p:cTn id="7" dur="500"/>
-                                        <p:tgtEl>
-                                          <p:spTgt spid="7"/>
-                                        </p:tgtEl>
-                                      </p:cBhvr>
-                                    </p:animEffect>
-                                  </p:childTnLst>
-                                </p:cTn>
-                              </p:par>
-                            </p:childTnLst>
-                          </p:cTn>
-                        </p:par>
-                      </p:childTnLst>
-                    </p:cTn>
-                  </p:par>
-                </p:childTnLst>
-              </p:cTn>
-              <p:prevCondLst>
-                <p:cond evt="onPrev" delay="0">
-                  <p:tgtEl>
-                    <p:sldTgt/>
-                  </p:tgtEl>
-                </p:cond>
-              </p:prevCondLst>
-              <p:nextCondLst>
-                <p:cond evt="onNext" delay="0">
-                  <p:tgtEl>
-                    <p:sldTgt/>
-                  </p:tgtEl>
-                </p:cond>
-              </p:nextCondLst>
-            </p:seq>
-          </p:childTnLst>
-        </p:cTn>
-      </p:par>
-    </p:tnLst>
-  </p:timing>
 </p:sld>
 </file>
 

</xml_diff>